<commit_message>
Last commit from laptop
</commit_message>
<xml_diff>
--- a/Methodology variability loss.pptx
+++ b/Methodology variability loss.pptx
@@ -111,6 +111,9 @@
   <p:extLst>
     <p:ext uri="{EFAFB233-063F-42B5-8137-9DF3F51BA10A}">
       <p15:sldGuideLst xmlns:p15="http://schemas.microsoft.com/office/powerpoint/2012/main"/>
+    </p:ext>
+    <p:ext uri="{2D200454-40CA-4A62-9FC3-DE9A4176ACB9}">
+      <p15:notesGuideLst xmlns:p15="http://schemas.microsoft.com/office/powerpoint/2012/main"/>
     </p:ext>
   </p:extLst>
 </p:presentation>
@@ -7128,7 +7131,7 @@
           <a:p>
             <a:fld id="{B25326C6-8D1B-4BFE-BA07-186F764B3EDE}" type="datetimeFigureOut">
               <a:rPr lang="en-GB" smtClean="0"/>
-              <a:t>09/01/2020</a:t>
+              <a:t>10/01/2020</a:t>
             </a:fld>
             <a:endParaRPr lang="en-GB"/>
           </a:p>
@@ -7354,7 +7357,7 @@
           <a:p>
             <a:fld id="{7DCA287C-DAB1-48E1-9384-EA16094FFDFD}" type="datetimeFigureOut">
               <a:rPr lang="en-GB" smtClean="0"/>
-              <a:t>09/01/2020</a:t>
+              <a:t>10/01/2020</a:t>
             </a:fld>
             <a:endParaRPr lang="en-GB"/>
           </a:p>
@@ -7524,7 +7527,7 @@
           <a:p>
             <a:fld id="{7DCA287C-DAB1-48E1-9384-EA16094FFDFD}" type="datetimeFigureOut">
               <a:rPr lang="en-GB" smtClean="0"/>
-              <a:t>09/01/2020</a:t>
+              <a:t>10/01/2020</a:t>
             </a:fld>
             <a:endParaRPr lang="en-GB"/>
           </a:p>
@@ -7704,7 +7707,7 @@
           <a:p>
             <a:fld id="{7DCA287C-DAB1-48E1-9384-EA16094FFDFD}" type="datetimeFigureOut">
               <a:rPr lang="en-GB" smtClean="0"/>
-              <a:t>09/01/2020</a:t>
+              <a:t>10/01/2020</a:t>
             </a:fld>
             <a:endParaRPr lang="en-GB"/>
           </a:p>
@@ -7874,7 +7877,7 @@
           <a:p>
             <a:fld id="{7DCA287C-DAB1-48E1-9384-EA16094FFDFD}" type="datetimeFigureOut">
               <a:rPr lang="en-GB" smtClean="0"/>
-              <a:t>09/01/2020</a:t>
+              <a:t>10/01/2020</a:t>
             </a:fld>
             <a:endParaRPr lang="en-GB"/>
           </a:p>
@@ -8118,7 +8121,7 @@
           <a:p>
             <a:fld id="{7DCA287C-DAB1-48E1-9384-EA16094FFDFD}" type="datetimeFigureOut">
               <a:rPr lang="en-GB" smtClean="0"/>
-              <a:t>09/01/2020</a:t>
+              <a:t>10/01/2020</a:t>
             </a:fld>
             <a:endParaRPr lang="en-GB"/>
           </a:p>
@@ -8350,7 +8353,7 @@
           <a:p>
             <a:fld id="{7DCA287C-DAB1-48E1-9384-EA16094FFDFD}" type="datetimeFigureOut">
               <a:rPr lang="en-GB" smtClean="0"/>
-              <a:t>09/01/2020</a:t>
+              <a:t>10/01/2020</a:t>
             </a:fld>
             <a:endParaRPr lang="en-GB"/>
           </a:p>
@@ -8717,7 +8720,7 @@
           <a:p>
             <a:fld id="{7DCA287C-DAB1-48E1-9384-EA16094FFDFD}" type="datetimeFigureOut">
               <a:rPr lang="en-GB" smtClean="0"/>
-              <a:t>09/01/2020</a:t>
+              <a:t>10/01/2020</a:t>
             </a:fld>
             <a:endParaRPr lang="en-GB"/>
           </a:p>
@@ -8835,7 +8838,7 @@
           <a:p>
             <a:fld id="{7DCA287C-DAB1-48E1-9384-EA16094FFDFD}" type="datetimeFigureOut">
               <a:rPr lang="en-GB" smtClean="0"/>
-              <a:t>09/01/2020</a:t>
+              <a:t>10/01/2020</a:t>
             </a:fld>
             <a:endParaRPr lang="en-GB"/>
           </a:p>
@@ -8930,7 +8933,7 @@
           <a:p>
             <a:fld id="{7DCA287C-DAB1-48E1-9384-EA16094FFDFD}" type="datetimeFigureOut">
               <a:rPr lang="en-GB" smtClean="0"/>
-              <a:t>09/01/2020</a:t>
+              <a:t>10/01/2020</a:t>
             </a:fld>
             <a:endParaRPr lang="en-GB"/>
           </a:p>
@@ -9207,7 +9210,7 @@
           <a:p>
             <a:fld id="{7DCA287C-DAB1-48E1-9384-EA16094FFDFD}" type="datetimeFigureOut">
               <a:rPr lang="en-GB" smtClean="0"/>
-              <a:t>09/01/2020</a:t>
+              <a:t>10/01/2020</a:t>
             </a:fld>
             <a:endParaRPr lang="en-GB"/>
           </a:p>
@@ -9464,7 +9467,7 @@
           <a:p>
             <a:fld id="{7DCA287C-DAB1-48E1-9384-EA16094FFDFD}" type="datetimeFigureOut">
               <a:rPr lang="en-GB" smtClean="0"/>
-              <a:t>09/01/2020</a:t>
+              <a:t>10/01/2020</a:t>
             </a:fld>
             <a:endParaRPr lang="en-GB"/>
           </a:p>
@@ -9677,7 +9680,7 @@
           <a:p>
             <a:fld id="{7DCA287C-DAB1-48E1-9384-EA16094FFDFD}" type="datetimeFigureOut">
               <a:rPr lang="en-GB" smtClean="0"/>
-              <a:t>09/01/2020</a:t>
+              <a:t>10/01/2020</a:t>
             </a:fld>
             <a:endParaRPr lang="en-GB"/>
           </a:p>
@@ -11014,16 +11017,15 @@
                           </a:rPr>
                           <m:t>𝜎</m:t>
                         </m:r>
-                        <m:acc>
-                          <m:accPr>
-                            <m:chr m:val="̅"/>
+                        <m:sSub>
+                          <m:sSubPr>
                             <m:ctrlPr>
                               <a:rPr lang="en-GB" b="0" i="1" smtClean="0">
                                 <a:latin typeface="Cambria Math" panose="02040503050406030204" pitchFamily="18" charset="0"/>
                                 <a:ea typeface="Cambria Math" panose="02040503050406030204" pitchFamily="18" charset="0"/>
                               </a:rPr>
                             </m:ctrlPr>
-                          </m:accPr>
+                          </m:sSubPr>
                           <m:e>
                             <m:r>
                               <a:rPr lang="en-GB" b="0" i="1" smtClean="0">
@@ -11033,7 +11035,30 @@
                               <m:t>𝑃</m:t>
                             </m:r>
                           </m:e>
-                        </m:acc>
+                          <m:sub>
+                            <m:r>
+                              <a:rPr lang="en-GB" b="0" i="1" smtClean="0">
+                                <a:latin typeface="Cambria Math" panose="02040503050406030204" pitchFamily="18" charset="0"/>
+                                <a:ea typeface="Cambria Math" panose="02040503050406030204" pitchFamily="18" charset="0"/>
+                              </a:rPr>
+                              <m:t>𝑟𝑎𝑡𝑒𝑑</m:t>
+                            </m:r>
+                            <m:r>
+                              <a:rPr lang="en-GB" b="0" i="1" smtClean="0">
+                                <a:latin typeface="Cambria Math" panose="02040503050406030204" pitchFamily="18" charset="0"/>
+                                <a:ea typeface="Cambria Math" panose="02040503050406030204" pitchFamily="18" charset="0"/>
+                              </a:rPr>
+                              <m:t> </m:t>
+                            </m:r>
+                            <m:r>
+                              <a:rPr lang="en-GB" b="0" i="1" smtClean="0">
+                                <a:latin typeface="Cambria Math" panose="02040503050406030204" pitchFamily="18" charset="0"/>
+                                <a:ea typeface="Cambria Math" panose="02040503050406030204" pitchFamily="18" charset="0"/>
+                              </a:rPr>
+                              <m:t>𝑐𝑎𝑝</m:t>
+                            </m:r>
+                          </m:sub>
+                        </m:sSub>
                       </m:den>
                     </m:f>
                   </m:oMath>
@@ -11083,7 +11108,13 @@
                             <a:rPr lang="en-GB" b="0" i="1" smtClean="0">
                               <a:latin typeface="Cambria Math" panose="02040503050406030204" pitchFamily="18" charset="0"/>
                             </a:rPr>
-                            <m:t>𝑤𝑜𝑟𝑠𝑡</m:t>
+                            <m:t>𝑤</m:t>
+                          </m:r>
+                          <m:r>
+                            <a:rPr lang="en-GB" b="0" i="1" smtClean="0">
+                              <a:latin typeface="Cambria Math" panose="02040503050406030204" pitchFamily="18" charset="0"/>
+                            </a:rPr>
+                            <m:t>𝑜𝑟𝑠𝑡</m:t>
                           </m:r>
                           <m:r>
                             <a:rPr lang="en-GB" b="0" i="1" smtClean="0">

</xml_diff>